<commit_message>
Added a lot of Files
</commit_message>
<xml_diff>
--- a/NLP/ppts/Class03-NLP_Basics.pptx
+++ b/NLP/ppts/Class03-NLP_Basics.pptx
@@ -109,6 +109,11 @@
       </a:defRPr>
     </a:lvl9pPr>
   </p:defaultTextStyle>
+  <p:extLst>
+    <p:ext uri="{EFAFB233-063F-42B5-8137-9DF3F51BA10A}">
+      <p15:sldGuideLst xmlns:p15="http://schemas.microsoft.com/office/powerpoint/2012/main"/>
+    </p:ext>
+  </p:extLst>
 </p:presentation>
 </file>
 
@@ -261,7 +266,7 @@
           <a:p>
             <a:fld id="{AD1C17BF-4772-FB41-97E8-CA3637EE7CE6}" type="datetimeFigureOut">
               <a:rPr lang="en-US" smtClean="0"/>
-              <a:t>1/15/23</a:t>
+              <a:t>1/22/23</a:t>
             </a:fld>
             <a:endParaRPr lang="en-US"/>
           </a:p>
@@ -461,7 +466,7 @@
           <a:p>
             <a:fld id="{AD1C17BF-4772-FB41-97E8-CA3637EE7CE6}" type="datetimeFigureOut">
               <a:rPr lang="en-US" smtClean="0"/>
-              <a:t>1/15/23</a:t>
+              <a:t>1/22/23</a:t>
             </a:fld>
             <a:endParaRPr lang="en-US"/>
           </a:p>
@@ -671,7 +676,7 @@
           <a:p>
             <a:fld id="{AD1C17BF-4772-FB41-97E8-CA3637EE7CE6}" type="datetimeFigureOut">
               <a:rPr lang="en-US" smtClean="0"/>
-              <a:t>1/15/23</a:t>
+              <a:t>1/22/23</a:t>
             </a:fld>
             <a:endParaRPr lang="en-US"/>
           </a:p>
@@ -871,7 +876,7 @@
           <a:p>
             <a:fld id="{AD1C17BF-4772-FB41-97E8-CA3637EE7CE6}" type="datetimeFigureOut">
               <a:rPr lang="en-US" smtClean="0"/>
-              <a:t>1/15/23</a:t>
+              <a:t>1/22/23</a:t>
             </a:fld>
             <a:endParaRPr lang="en-US"/>
           </a:p>
@@ -1147,7 +1152,7 @@
           <a:p>
             <a:fld id="{AD1C17BF-4772-FB41-97E8-CA3637EE7CE6}" type="datetimeFigureOut">
               <a:rPr lang="en-US" smtClean="0"/>
-              <a:t>1/15/23</a:t>
+              <a:t>1/22/23</a:t>
             </a:fld>
             <a:endParaRPr lang="en-US"/>
           </a:p>
@@ -1415,7 +1420,7 @@
           <a:p>
             <a:fld id="{AD1C17BF-4772-FB41-97E8-CA3637EE7CE6}" type="datetimeFigureOut">
               <a:rPr lang="en-US" smtClean="0"/>
-              <a:t>1/15/23</a:t>
+              <a:t>1/22/23</a:t>
             </a:fld>
             <a:endParaRPr lang="en-US"/>
           </a:p>
@@ -1830,7 +1835,7 @@
           <a:p>
             <a:fld id="{AD1C17BF-4772-FB41-97E8-CA3637EE7CE6}" type="datetimeFigureOut">
               <a:rPr lang="en-US" smtClean="0"/>
-              <a:t>1/15/23</a:t>
+              <a:t>1/22/23</a:t>
             </a:fld>
             <a:endParaRPr lang="en-US"/>
           </a:p>
@@ -1972,7 +1977,7 @@
           <a:p>
             <a:fld id="{AD1C17BF-4772-FB41-97E8-CA3637EE7CE6}" type="datetimeFigureOut">
               <a:rPr lang="en-US" smtClean="0"/>
-              <a:t>1/15/23</a:t>
+              <a:t>1/22/23</a:t>
             </a:fld>
             <a:endParaRPr lang="en-US"/>
           </a:p>
@@ -2085,7 +2090,7 @@
           <a:p>
             <a:fld id="{AD1C17BF-4772-FB41-97E8-CA3637EE7CE6}" type="datetimeFigureOut">
               <a:rPr lang="en-US" smtClean="0"/>
-              <a:t>1/15/23</a:t>
+              <a:t>1/22/23</a:t>
             </a:fld>
             <a:endParaRPr lang="en-US"/>
           </a:p>
@@ -2398,7 +2403,7 @@
           <a:p>
             <a:fld id="{AD1C17BF-4772-FB41-97E8-CA3637EE7CE6}" type="datetimeFigureOut">
               <a:rPr lang="en-US" smtClean="0"/>
-              <a:t>1/15/23</a:t>
+              <a:t>1/22/23</a:t>
             </a:fld>
             <a:endParaRPr lang="en-US"/>
           </a:p>
@@ -2687,7 +2692,7 @@
           <a:p>
             <a:fld id="{AD1C17BF-4772-FB41-97E8-CA3637EE7CE6}" type="datetimeFigureOut">
               <a:rPr lang="en-US" smtClean="0"/>
-              <a:t>1/15/23</a:t>
+              <a:t>1/22/23</a:t>
             </a:fld>
             <a:endParaRPr lang="en-US"/>
           </a:p>
@@ -2930,7 +2935,7 @@
           <a:p>
             <a:fld id="{AD1C17BF-4772-FB41-97E8-CA3637EE7CE6}" type="datetimeFigureOut">
               <a:rPr lang="en-US" smtClean="0"/>
-              <a:t>1/15/23</a:t>
+              <a:t>1/22/23</a:t>
             </a:fld>
             <a:endParaRPr lang="en-US"/>
           </a:p>

</xml_diff>